<commit_message>
[lecture] Rework the second part of the 5th lecture. Rewrite the voice for it.
git-svn-id: https://mipt-mips.googlecode.com/svn@96 7b285467-9990-9c3a-2c35-738ad0b76374
</commit_message>
<xml_diff>
--- a/lectures/Lecture_5__26_Oct__Transistors_and_Integrated_Circuits__Eng_text__No_audio.pptx
+++ b/lectures/Lecture_5__26_Oct__Transistors_and_Integrated_Circuits__Eng_text__No_audio.pptx
@@ -12286,8 +12286,13 @@
             </a:r>
             <a:r>
               <a:rPr lang="en-US" dirty="0"/>
-              <a:t>complementary paths</a:t>
+              <a:t>complementary </a:t>
             </a:r>
+            <a:r>
+              <a:rPr lang="en-US" dirty="0" smtClean="0"/>
+              <a:t>parts</a:t>
+            </a:r>
+            <a:endParaRPr lang="en-US" dirty="0"/>
           </a:p>
           <a:p>
             <a:pPr marL="757238" lvl="2" indent="-342900">
@@ -12354,7 +12359,6 @@
               <a:rPr lang="en-US" dirty="0"/>
               <a:t> to output</a:t>
             </a:r>
-            <a:endParaRPr lang="en-US" dirty="0"/>
           </a:p>
           <a:p>
             <a:pPr marL="757238" lvl="2" indent="-342900">
@@ -12368,7 +12372,6 @@
               <a:rPr lang="en-US" dirty="0"/>
               <a:t>When one part is turned on the other part is disabled (provides Z)</a:t>
             </a:r>
-            <a:endParaRPr lang="en-US" dirty="0"/>
           </a:p>
         </p:txBody>
       </p:sp>
@@ -13334,9 +13337,6 @@
                 </a:rPr>
                 <a:t>Gate</a:t>
               </a:r>
-              <a:endParaRPr lang="en-US" sz="1400" dirty="0" smtClean="0">
-                <a:latin typeface="Neo Sans Intel" pitchFamily="34" charset="0"/>
-              </a:endParaRPr>
             </a:p>
           </p:txBody>
         </p:sp>
@@ -13368,9 +13368,6 @@
                 </a:rPr>
                 <a:t>Drain</a:t>
               </a:r>
-              <a:endParaRPr lang="en-US" sz="1400" dirty="0" smtClean="0">
-                <a:latin typeface="Neo Sans Intel" pitchFamily="34" charset="0"/>
-              </a:endParaRPr>
             </a:p>
           </p:txBody>
         </p:sp>
@@ -13402,9 +13399,6 @@
                 </a:rPr>
                 <a:t>Source</a:t>
               </a:r>
-              <a:endParaRPr lang="en-US" sz="1400" dirty="0" smtClean="0">
-                <a:latin typeface="Neo Sans Intel" pitchFamily="34" charset="0"/>
-              </a:endParaRPr>
             </a:p>
           </p:txBody>
         </p:sp>
@@ -13683,9 +13677,6 @@
                   </a:rPr>
                   <a:t>Gate</a:t>
                 </a:r>
-                <a:endParaRPr lang="en-US" sz="1400" dirty="0" smtClean="0">
-                  <a:latin typeface="Neo Sans Intel" pitchFamily="34" charset="0"/>
-                </a:endParaRPr>
               </a:p>
             </p:txBody>
           </p:sp>
@@ -13717,9 +13708,6 @@
                   </a:rPr>
                   <a:t>Drain</a:t>
                 </a:r>
-                <a:endParaRPr lang="en-US" sz="1400" dirty="0" smtClean="0">
-                  <a:latin typeface="Neo Sans Intel" pitchFamily="34" charset="0"/>
-                </a:endParaRPr>
               </a:p>
             </p:txBody>
           </p:sp>
@@ -13751,9 +13739,6 @@
                   </a:rPr>
                   <a:t>Source</a:t>
                 </a:r>
-                <a:endParaRPr lang="en-US" sz="1400" dirty="0" smtClean="0">
-                  <a:latin typeface="Neo Sans Intel" pitchFamily="34" charset="0"/>
-                </a:endParaRPr>
               </a:p>
             </p:txBody>
           </p:sp>
@@ -13939,13 +13924,6 @@
               </a:rPr>
               <a:t>0</a:t>
             </a:r>
-            <a:endParaRPr lang="en-US" dirty="0" smtClean="0">
-              <a:solidFill>
-                <a:schemeClr val="accent1"/>
-              </a:solidFill>
-              <a:latin typeface="Consolas" pitchFamily="49" charset="0"/>
-              <a:cs typeface="Consolas" pitchFamily="49" charset="0"/>
-            </a:endParaRPr>
           </a:p>
         </p:txBody>
       </p:sp>
@@ -14839,13 +14817,6 @@
                 </a:rPr>
                 <a:t>0</a:t>
               </a:r>
-              <a:endParaRPr lang="en-US" dirty="0" smtClean="0">
-                <a:solidFill>
-                  <a:schemeClr val="accent1"/>
-                </a:solidFill>
-                <a:latin typeface="Consolas" pitchFamily="49" charset="0"/>
-                <a:cs typeface="Consolas" pitchFamily="49" charset="0"/>
-              </a:endParaRPr>
             </a:p>
           </p:txBody>
         </p:sp>
@@ -15384,9 +15355,6 @@
                 </a:rPr>
                 <a:t>Input</a:t>
               </a:r>
-              <a:endParaRPr lang="en-US" dirty="0" smtClean="0">
-                <a:latin typeface="Neo Sans Intel" pitchFamily="34" charset="0"/>
-              </a:endParaRPr>
             </a:p>
           </p:txBody>
         </p:sp>
@@ -15462,9 +15430,6 @@
                 </a:rPr>
                 <a:t>Output</a:t>
               </a:r>
-              <a:endParaRPr lang="en-US" dirty="0" smtClean="0">
-                <a:latin typeface="Neo Sans Intel" pitchFamily="34" charset="0"/>
-              </a:endParaRPr>
             </a:p>
           </p:txBody>
         </p:sp>
@@ -15626,13 +15591,6 @@
               </a:rPr>
               <a:t>0</a:t>
             </a:r>
-            <a:endParaRPr lang="en-US" dirty="0" smtClean="0">
-              <a:solidFill>
-                <a:schemeClr val="accent1"/>
-              </a:solidFill>
-              <a:latin typeface="Consolas" pitchFamily="49" charset="0"/>
-              <a:cs typeface="Consolas" pitchFamily="49" charset="0"/>
-            </a:endParaRPr>
           </a:p>
         </p:txBody>
       </p:sp>
@@ -15955,13 +15913,7 @@
               <a:rPr lang="en-US" b="1" dirty="0" smtClean="0">
                 <a:latin typeface="Neo Sans Intel" pitchFamily="34" charset="0"/>
               </a:rPr>
-              <a:t>bottom</a:t>
-            </a:r>
-            <a:r>
-              <a:rPr lang="en-US" b="1" dirty="0" smtClean="0">
-                <a:latin typeface="Neo Sans Intel" pitchFamily="34" charset="0"/>
-              </a:rPr>
-              <a:t> </a:t>
+              <a:t>bottom </a:t>
             </a:r>
             <a:r>
               <a:rPr lang="en-US" dirty="0" smtClean="0">
@@ -15969,9 +15921,6 @@
               </a:rPr>
               <a:t>part</a:t>
             </a:r>
-            <a:endParaRPr lang="en-US" dirty="0" smtClean="0">
-              <a:latin typeface="Neo Sans Intel" pitchFamily="34" charset="0"/>
-            </a:endParaRPr>
           </a:p>
         </p:txBody>
       </p:sp>
@@ -16015,9 +15964,6 @@
               </a:rPr>
               <a:t>part</a:t>
             </a:r>
-            <a:endParaRPr lang="en-US" dirty="0" smtClean="0">
-              <a:latin typeface="Neo Sans Intel" pitchFamily="34" charset="0"/>
-            </a:endParaRPr>
           </a:p>
         </p:txBody>
       </p:sp>
@@ -16053,13 +15999,7 @@
               <a:rPr lang="en-US" b="1" dirty="0" smtClean="0">
                 <a:latin typeface="Neo Sans Intel" pitchFamily="34" charset="0"/>
               </a:rPr>
-              <a:t>full</a:t>
-            </a:r>
-            <a:r>
-              <a:rPr lang="en-US" b="1" dirty="0" smtClean="0">
-                <a:latin typeface="Neo Sans Intel" pitchFamily="34" charset="0"/>
-              </a:rPr>
-              <a:t> </a:t>
+              <a:t>full </a:t>
             </a:r>
             <a:r>
               <a:rPr lang="en-US" dirty="0" smtClean="0">
@@ -16067,9 +16007,6 @@
               </a:rPr>
               <a:t>scheme</a:t>
             </a:r>
-            <a:endParaRPr lang="en-US" dirty="0" smtClean="0">
-              <a:latin typeface="Neo Sans Intel" pitchFamily="34" charset="0"/>
-            </a:endParaRPr>
           </a:p>
         </p:txBody>
       </p:sp>
@@ -16324,9 +16261,6 @@
                 </a:rPr>
                 <a:t>Input</a:t>
               </a:r>
-              <a:endParaRPr lang="en-US" dirty="0" smtClean="0">
-                <a:latin typeface="Neo Sans Intel" pitchFamily="34" charset="0"/>
-              </a:endParaRPr>
             </a:p>
           </p:txBody>
         </p:sp>
@@ -16356,17 +16290,8 @@
                 <a:rPr lang="en-US" dirty="0" smtClean="0">
                   <a:latin typeface="Neo Sans Intel" pitchFamily="34" charset="0"/>
                 </a:rPr>
-                <a:t>Out</a:t>
+                <a:t>Output</a:t>
               </a:r>
-              <a:r>
-                <a:rPr lang="en-US" dirty="0" smtClean="0">
-                  <a:latin typeface="Neo Sans Intel" pitchFamily="34" charset="0"/>
-                </a:rPr>
-                <a:t>put</a:t>
-              </a:r>
-              <a:endParaRPr lang="en-US" dirty="0" smtClean="0">
-                <a:latin typeface="Neo Sans Intel" pitchFamily="34" charset="0"/>
-              </a:endParaRPr>
             </a:p>
           </p:txBody>
         </p:sp>
@@ -20342,11 +20267,7 @@
             </a:r>
             <a:r>
               <a:rPr lang="en-US" dirty="0" smtClean="0"/>
-              <a:t>onsumption in </a:t>
-            </a:r>
-            <a:r>
-              <a:rPr lang="en-US" dirty="0" smtClean="0"/>
-              <a:t>CMOS</a:t>
+              <a:t>onsumption in CMOS</a:t>
             </a:r>
             <a:endParaRPr lang="en-US" dirty="0"/>
           </a:p>
@@ -21049,13 +20970,6 @@
                   </a:rPr>
                   <a:t>0</a:t>
                 </a:r>
-                <a:endParaRPr lang="en-US" sz="1600" dirty="0" smtClean="0">
-                  <a:solidFill>
-                    <a:schemeClr val="accent1"/>
-                  </a:solidFill>
-                  <a:latin typeface="Consolas" pitchFamily="49" charset="0"/>
-                  <a:cs typeface="Consolas" pitchFamily="49" charset="0"/>
-                </a:endParaRPr>
               </a:p>
             </p:txBody>
           </p:sp>
@@ -21594,9 +21508,6 @@
                   </a:rPr>
                   <a:t>Input</a:t>
                 </a:r>
-                <a:endParaRPr lang="en-US" sz="1600" dirty="0" smtClean="0">
-                  <a:latin typeface="Neo Sans Intel" pitchFamily="34" charset="0"/>
-                </a:endParaRPr>
               </a:p>
             </p:txBody>
           </p:sp>
@@ -21672,9 +21583,6 @@
                   </a:rPr>
                   <a:t>Output</a:t>
                 </a:r>
-                <a:endParaRPr lang="en-US" sz="1600" dirty="0" smtClean="0">
-                  <a:latin typeface="Neo Sans Intel" pitchFamily="34" charset="0"/>
-                </a:endParaRPr>
               </a:p>
             </p:txBody>
           </p:sp>
@@ -23398,9 +23306,6 @@
                   </a:rPr>
                   <a:t>A</a:t>
                 </a:r>
-                <a:endParaRPr lang="en-US" dirty="0" smtClean="0">
-                  <a:latin typeface="Neo Sans Intel" pitchFamily="34" charset="0"/>
-                </a:endParaRPr>
               </a:p>
             </p:txBody>
           </p:sp>
@@ -23627,17 +23532,8 @@
                 <a:rPr lang="en-US" dirty="0" smtClean="0">
                   <a:latin typeface="Neo Sans Intel" pitchFamily="34" charset="0"/>
                 </a:rPr>
-                <a:t>Out</a:t>
+                <a:t>Output</a:t>
               </a:r>
-              <a:r>
-                <a:rPr lang="en-US" dirty="0" smtClean="0">
-                  <a:latin typeface="Neo Sans Intel" pitchFamily="34" charset="0"/>
-                </a:rPr>
-                <a:t>put</a:t>
-              </a:r>
-              <a:endParaRPr lang="en-US" dirty="0" smtClean="0">
-                <a:latin typeface="Neo Sans Intel" pitchFamily="34" charset="0"/>
-              </a:endParaRPr>
             </a:p>
           </p:txBody>
         </p:sp>
@@ -24022,13 +23918,6 @@
                   </a:rPr>
                   <a:t>0</a:t>
                 </a:r>
-                <a:endParaRPr lang="en-US" sz="1600" dirty="0" smtClean="0">
-                  <a:solidFill>
-                    <a:schemeClr val="accent1"/>
-                  </a:solidFill>
-                  <a:latin typeface="Consolas" pitchFamily="49" charset="0"/>
-                  <a:cs typeface="Consolas" pitchFamily="49" charset="0"/>
-                </a:endParaRPr>
               </a:p>
             </p:txBody>
           </p:sp>
@@ -24293,9 +24182,6 @@
                   </a:rPr>
                   <a:t>A</a:t>
                 </a:r>
-                <a:endParaRPr lang="en-US" sz="1600" dirty="0" smtClean="0">
-                  <a:latin typeface="Neo Sans Intel" pitchFamily="34" charset="0"/>
-                </a:endParaRPr>
               </a:p>
             </p:txBody>
           </p:sp>
@@ -24405,9 +24291,6 @@
                   </a:rPr>
                   <a:t>Output</a:t>
                 </a:r>
-                <a:endParaRPr lang="en-US" sz="1600" dirty="0" smtClean="0">
-                  <a:latin typeface="Neo Sans Intel" pitchFamily="34" charset="0"/>
-                </a:endParaRPr>
               </a:p>
             </p:txBody>
           </p:sp>
@@ -24875,9 +24758,6 @@
                 </a:rPr>
                 <a:t>A</a:t>
               </a:r>
-              <a:endParaRPr lang="en-US" sz="1600" dirty="0" smtClean="0">
-                <a:latin typeface="Neo Sans Intel" pitchFamily="34" charset="0"/>
-              </a:endParaRPr>
             </a:p>
           </p:txBody>
         </p:sp>
@@ -24952,9 +24832,6 @@
                   </a:rPr>
                   <a:t>Output</a:t>
                 </a:r>
-                <a:endParaRPr lang="en-US" sz="1600" dirty="0" smtClean="0">
-                  <a:latin typeface="Neo Sans Intel" pitchFamily="34" charset="0"/>
-                </a:endParaRPr>
               </a:p>
             </p:txBody>
           </p:sp>
@@ -25808,9 +25685,6 @@
                   </a:rPr>
                   <a:t>A</a:t>
                 </a:r>
-                <a:endParaRPr lang="en-US" sz="1600" dirty="0" smtClean="0">
-                  <a:latin typeface="Neo Sans Intel" pitchFamily="34" charset="0"/>
-                </a:endParaRPr>
               </a:p>
             </p:txBody>
           </p:sp>
@@ -25885,9 +25759,6 @@
                     </a:rPr>
                     <a:t>Output</a:t>
                   </a:r>
-                  <a:endParaRPr lang="en-US" sz="1600" dirty="0" smtClean="0">
-                    <a:latin typeface="Neo Sans Intel" pitchFamily="34" charset="0"/>
-                  </a:endParaRPr>
                 </a:p>
               </p:txBody>
             </p:sp>
@@ -26645,13 +26516,6 @@
                     </a:rPr>
                     <a:t>0</a:t>
                   </a:r>
-                  <a:endParaRPr lang="en-US" sz="1600" dirty="0" smtClean="0">
-                    <a:solidFill>
-                      <a:schemeClr val="accent1"/>
-                    </a:solidFill>
-                    <a:latin typeface="Consolas" pitchFamily="49" charset="0"/>
-                    <a:cs typeface="Consolas" pitchFamily="49" charset="0"/>
-                  </a:endParaRPr>
                 </a:p>
               </p:txBody>
             </p:sp>
@@ -26916,9 +26780,6 @@
                     </a:rPr>
                     <a:t>A</a:t>
                   </a:r>
-                  <a:endParaRPr lang="en-US" sz="1600" dirty="0" smtClean="0">
-                    <a:latin typeface="Neo Sans Intel" pitchFamily="34" charset="0"/>
-                  </a:endParaRPr>
                 </a:p>
               </p:txBody>
             </p:sp>
@@ -26991,13 +26852,7 @@
               <a:rPr lang="en-US" b="1" dirty="0" smtClean="0">
                 <a:latin typeface="Neo Sans Intel" pitchFamily="34" charset="0"/>
               </a:rPr>
-              <a:t>bottom</a:t>
-            </a:r>
-            <a:r>
-              <a:rPr lang="en-US" b="1" dirty="0" smtClean="0">
-                <a:latin typeface="Neo Sans Intel" pitchFamily="34" charset="0"/>
-              </a:rPr>
-              <a:t> </a:t>
+              <a:t>bottom </a:t>
             </a:r>
             <a:r>
               <a:rPr lang="en-US" dirty="0" smtClean="0">
@@ -27005,9 +26860,6 @@
               </a:rPr>
               <a:t>part</a:t>
             </a:r>
-            <a:endParaRPr lang="en-US" dirty="0" smtClean="0">
-              <a:latin typeface="Neo Sans Intel" pitchFamily="34" charset="0"/>
-            </a:endParaRPr>
           </a:p>
         </p:txBody>
       </p:sp>
@@ -27051,9 +26903,6 @@
               </a:rPr>
               <a:t>part</a:t>
             </a:r>
-            <a:endParaRPr lang="en-US" dirty="0" smtClean="0">
-              <a:latin typeface="Neo Sans Intel" pitchFamily="34" charset="0"/>
-            </a:endParaRPr>
           </a:p>
         </p:txBody>
       </p:sp>
@@ -27089,13 +26938,7 @@
               <a:rPr lang="en-US" b="1" dirty="0" smtClean="0">
                 <a:latin typeface="Neo Sans Intel" pitchFamily="34" charset="0"/>
               </a:rPr>
-              <a:t>full</a:t>
-            </a:r>
-            <a:r>
-              <a:rPr lang="en-US" b="1" dirty="0" smtClean="0">
-                <a:latin typeface="Neo Sans Intel" pitchFamily="34" charset="0"/>
-              </a:rPr>
-              <a:t> </a:t>
+              <a:t>full </a:t>
             </a:r>
             <a:r>
               <a:rPr lang="en-US" dirty="0" smtClean="0">
@@ -27103,9 +26946,6 @@
               </a:rPr>
               <a:t>scheme</a:t>
             </a:r>
-            <a:endParaRPr lang="en-US" dirty="0" smtClean="0">
-              <a:latin typeface="Neo Sans Intel" pitchFamily="34" charset="0"/>
-            </a:endParaRPr>
           </a:p>
         </p:txBody>
       </p:sp>
@@ -40964,11 +40804,7 @@
             </a:pPr>
             <a:r>
               <a:rPr lang="en-US" sz="2000" dirty="0" smtClean="0"/>
-              <a:t>The current passes though the small channel created by the gate </a:t>
-            </a:r>
-            <a:r>
-              <a:rPr lang="en-US" sz="2000" dirty="0" smtClean="0"/>
-              <a:t>field </a:t>
+              <a:t>The current passes though the small channel created by the gate field </a:t>
             </a:r>
             <a:r>
               <a:rPr lang="en-US" sz="2000" dirty="0" smtClean="0">
@@ -40978,27 +40814,7 @@
                   </a:schemeClr>
                 </a:solidFill>
               </a:rPr>
-              <a:t>(more detailed explanatio</a:t>
-            </a:r>
-            <a:r>
-              <a:rPr lang="en-US" sz="2000" dirty="0" smtClean="0">
-                <a:solidFill>
-                  <a:schemeClr val="tx2">
-                    <a:lumMod val="75000"/>
-                  </a:schemeClr>
-                </a:solidFill>
-              </a:rPr>
-              <a:t>n is out of scope of our course)</a:t>
-            </a:r>
-            <a:r>
-              <a:rPr lang="en-US" sz="2000" dirty="0" smtClean="0">
-                <a:solidFill>
-                  <a:schemeClr val="tx2">
-                    <a:lumMod val="75000"/>
-                  </a:schemeClr>
-                </a:solidFill>
-              </a:rPr>
-              <a:t> </a:t>
+              <a:t>(more detailed explanation is out of scope of our course) </a:t>
             </a:r>
             <a:endParaRPr lang="en-US" sz="2000" dirty="0">
               <a:solidFill>
@@ -44107,50 +43923,6 @@
           </a:graphicData>
         </a:graphic>
       </p:graphicFrame>
-      <p:sp>
-        <p:nvSpPr>
-          <p:cNvPr id="22" name="Oval 21"/>
-          <p:cNvSpPr/>
-          <p:nvPr/>
-        </p:nvSpPr>
-        <p:spPr bwMode="auto">
-          <a:xfrm>
-            <a:off x="8158480" y="4408544"/>
-            <a:ext cx="116840" cy="116840"/>
-          </a:xfrm>
-          <a:prstGeom prst="ellipse">
-            <a:avLst/>
-          </a:prstGeom>
-          <a:solidFill>
-            <a:schemeClr val="bg1"/>
-          </a:solidFill>
-          <a:ln w="19050" cap="flat" cmpd="sng" algn="ctr">
-            <a:solidFill>
-              <a:schemeClr val="tx1"/>
-            </a:solidFill>
-            <a:prstDash val="solid"/>
-            <a:round/>
-            <a:headEnd type="none" w="sm" len="sm"/>
-            <a:tailEnd type="none" w="sm" len="sm"/>
-          </a:ln>
-          <a:effectLst/>
-        </p:spPr>
-        <p:txBody>
-          <a:bodyPr vert="horz" wrap="none" lIns="91440" tIns="45720" rIns="91440" bIns="45720" numCol="1" rtlCol="0" anchor="ctr" anchorCtr="0" compatLnSpc="1">
-            <a:prstTxWarp prst="textNoShape">
-              <a:avLst/>
-            </a:prstTxWarp>
-          </a:bodyPr>
-          <a:lstStyle/>
-          <a:p>
-            <a:pPr algn="ctr" eaLnBrk="0" hangingPunct="0"/>
-            <a:endParaRPr lang="en-US" sz="2000" b="1" smtClean="0">
-              <a:latin typeface="Neo Sans Intel" pitchFamily="34" charset="0"/>
-              <a:cs typeface="Arial" pitchFamily="34" charset="0"/>
-            </a:endParaRPr>
-          </a:p>
-        </p:txBody>
-      </p:sp>
       <p:grpSp>
         <p:nvGrpSpPr>
           <p:cNvPr id="35" name="Group 34"/>
@@ -44411,9 +44183,6 @@
                 </a:rPr>
                 <a:t>Gate</a:t>
               </a:r>
-              <a:endParaRPr lang="en-US" sz="1400" dirty="0" smtClean="0">
-                <a:latin typeface="Neo Sans Intel" pitchFamily="34" charset="0"/>
-              </a:endParaRPr>
             </a:p>
           </p:txBody>
         </p:sp>
@@ -44445,9 +44214,6 @@
                 </a:rPr>
                 <a:t>Drain</a:t>
               </a:r>
-              <a:endParaRPr lang="en-US" sz="1400" dirty="0" smtClean="0">
-                <a:latin typeface="Neo Sans Intel" pitchFamily="34" charset="0"/>
-              </a:endParaRPr>
             </a:p>
           </p:txBody>
         </p:sp>
@@ -44479,9 +44245,6 @@
                 </a:rPr>
                 <a:t>Source</a:t>
               </a:r>
-              <a:endParaRPr lang="en-US" sz="1400" dirty="0" smtClean="0">
-                <a:latin typeface="Neo Sans Intel" pitchFamily="34" charset="0"/>
-              </a:endParaRPr>
             </a:p>
           </p:txBody>
         </p:sp>
@@ -44495,7 +44258,7 @@
           <p:nvPr>
             <p:extLst>
               <p:ext uri="{D42A27DB-BD31-4B8C-83A1-F6EECF244321}">
-                <p14:modId xmlns:p14="http://schemas.microsoft.com/office/powerpoint/2010/main" val="459702801"/>
+                <p14:modId xmlns:p14="http://schemas.microsoft.com/office/powerpoint/2010/main" val="179946405"/>
               </p:ext>
             </p:extLst>
           </p:nvPr>
@@ -44844,7 +44607,13 @@
                         <a:rPr lang="en-US" sz="1000" baseline="0" dirty="0" smtClean="0">
                           <a:latin typeface="Neo Sans Intel" pitchFamily="34" charset="0"/>
                         </a:rPr>
-                        <a:t> value than 1)</a:t>
+                        <a:t> value than </a:t>
+                      </a:r>
+                      <a:r>
+                        <a:rPr lang="en-US" sz="1000" baseline="0" dirty="0" smtClean="0">
+                          <a:latin typeface="Neo Sans Intel" pitchFamily="34" charset="0"/>
+                        </a:rPr>
+                        <a:t>0)</a:t>
                       </a:r>
                       <a:endParaRPr lang="en-US" sz="1000" dirty="0">
                         <a:latin typeface="Neo Sans Intel" pitchFamily="34" charset="0"/>
@@ -45198,9 +44967,6 @@
                   </a:rPr>
                   <a:t>Gate</a:t>
                 </a:r>
-                <a:endParaRPr lang="en-US" sz="1400" dirty="0" smtClean="0">
-                  <a:latin typeface="Neo Sans Intel" pitchFamily="34" charset="0"/>
-                </a:endParaRPr>
               </a:p>
             </p:txBody>
           </p:sp>
@@ -45232,9 +44998,6 @@
                   </a:rPr>
                   <a:t>Drain</a:t>
                 </a:r>
-                <a:endParaRPr lang="en-US" sz="1400" dirty="0" smtClean="0">
-                  <a:latin typeface="Neo Sans Intel" pitchFamily="34" charset="0"/>
-                </a:endParaRPr>
               </a:p>
             </p:txBody>
           </p:sp>
@@ -45266,9 +45029,6 @@
                   </a:rPr>
                   <a:t>Source</a:t>
                 </a:r>
-                <a:endParaRPr lang="en-US" sz="1400" dirty="0" smtClean="0">
-                  <a:latin typeface="Neo Sans Intel" pitchFamily="34" charset="0"/>
-                </a:endParaRPr>
               </a:p>
             </p:txBody>
           </p:sp>
@@ -45352,9 +45112,6 @@
               </a:rPr>
               <a:t>N-type MOSFET:</a:t>
             </a:r>
-            <a:endParaRPr lang="en-US" sz="2400" dirty="0" smtClean="0">
-              <a:latin typeface="Neo Sans Intel" pitchFamily="34" charset="0"/>
-            </a:endParaRPr>
           </a:p>
         </p:txBody>
       </p:sp>
@@ -45413,9 +45170,6 @@
               </a:rPr>
               <a:t>:</a:t>
             </a:r>
-            <a:endParaRPr lang="en-US" sz="2400" dirty="0" smtClean="0">
-              <a:latin typeface="Neo Sans Intel" pitchFamily="34" charset="0"/>
-            </a:endParaRPr>
           </a:p>
         </p:txBody>
       </p:sp>
@@ -45531,9 +45285,469 @@
   <p:timing>
     <p:tnLst>
       <p:par>
-        <p:cTn id="1" dur="indefinite" restart="never" nodeType="tmRoot"/>
+        <p:cTn id="1" dur="indefinite" restart="never" nodeType="tmRoot">
+          <p:childTnLst>
+            <p:seq concurrent="1" nextAc="seek">
+              <p:cTn id="2" dur="indefinite" nodeType="mainSeq">
+                <p:childTnLst>
+                  <p:par>
+                    <p:cTn id="3" fill="hold">
+                      <p:stCondLst>
+                        <p:cond delay="indefinite"/>
+                      </p:stCondLst>
+                      <p:childTnLst>
+                        <p:par>
+                          <p:cTn id="4" fill="hold">
+                            <p:stCondLst>
+                              <p:cond delay="0"/>
+                            </p:stCondLst>
+                            <p:childTnLst>
+                              <p:par>
+                                <p:cTn id="5" presetID="10" presetClass="entr" presetSubtype="0" fill="hold" nodeType="clickEffect">
+                                  <p:stCondLst>
+                                    <p:cond delay="0"/>
+                                  </p:stCondLst>
+                                  <p:childTnLst>
+                                    <p:set>
+                                      <p:cBhvr>
+                                        <p:cTn id="6" dur="1" fill="hold">
+                                          <p:stCondLst>
+                                            <p:cond delay="0"/>
+                                          </p:stCondLst>
+                                        </p:cTn>
+                                        <p:tgtEl>
+                                          <p:spTgt spid="54">
+                                            <p:txEl>
+                                              <p:pRg st="0" end="0"/>
+                                            </p:txEl>
+                                          </p:spTgt>
+                                        </p:tgtEl>
+                                        <p:attrNameLst>
+                                          <p:attrName>style.visibility</p:attrName>
+                                        </p:attrNameLst>
+                                      </p:cBhvr>
+                                      <p:to>
+                                        <p:strVal val="visible"/>
+                                      </p:to>
+                                    </p:set>
+                                    <p:animEffect transition="in" filter="fade">
+                                      <p:cBhvr>
+                                        <p:cTn id="7" dur="500"/>
+                                        <p:tgtEl>
+                                          <p:spTgt spid="54">
+                                            <p:txEl>
+                                              <p:pRg st="0" end="0"/>
+                                            </p:txEl>
+                                          </p:spTgt>
+                                        </p:tgtEl>
+                                      </p:cBhvr>
+                                    </p:animEffect>
+                                  </p:childTnLst>
+                                </p:cTn>
+                              </p:par>
+                            </p:childTnLst>
+                          </p:cTn>
+                        </p:par>
+                      </p:childTnLst>
+                    </p:cTn>
+                  </p:par>
+                  <p:par>
+                    <p:cTn id="8" fill="hold">
+                      <p:stCondLst>
+                        <p:cond delay="indefinite"/>
+                      </p:stCondLst>
+                      <p:childTnLst>
+                        <p:par>
+                          <p:cTn id="9" fill="hold">
+                            <p:stCondLst>
+                              <p:cond delay="0"/>
+                            </p:stCondLst>
+                            <p:childTnLst>
+                              <p:par>
+                                <p:cTn id="10" presetID="10" presetClass="entr" presetSubtype="0" fill="hold" nodeType="clickEffect">
+                                  <p:stCondLst>
+                                    <p:cond delay="0"/>
+                                  </p:stCondLst>
+                                  <p:childTnLst>
+                                    <p:set>
+                                      <p:cBhvr>
+                                        <p:cTn id="11" dur="1" fill="hold">
+                                          <p:stCondLst>
+                                            <p:cond delay="0"/>
+                                          </p:stCondLst>
+                                        </p:cTn>
+                                        <p:tgtEl>
+                                          <p:spTgt spid="35"/>
+                                        </p:tgtEl>
+                                        <p:attrNameLst>
+                                          <p:attrName>style.visibility</p:attrName>
+                                        </p:attrNameLst>
+                                      </p:cBhvr>
+                                      <p:to>
+                                        <p:strVal val="visible"/>
+                                      </p:to>
+                                    </p:set>
+                                    <p:animEffect transition="in" filter="fade">
+                                      <p:cBhvr>
+                                        <p:cTn id="12" dur="500"/>
+                                        <p:tgtEl>
+                                          <p:spTgt spid="35"/>
+                                        </p:tgtEl>
+                                      </p:cBhvr>
+                                    </p:animEffect>
+                                  </p:childTnLst>
+                                </p:cTn>
+                              </p:par>
+                            </p:childTnLst>
+                          </p:cTn>
+                        </p:par>
+                      </p:childTnLst>
+                    </p:cTn>
+                  </p:par>
+                  <p:par>
+                    <p:cTn id="13" fill="hold">
+                      <p:stCondLst>
+                        <p:cond delay="indefinite"/>
+                      </p:stCondLst>
+                      <p:childTnLst>
+                        <p:par>
+                          <p:cTn id="14" fill="hold">
+                            <p:stCondLst>
+                              <p:cond delay="0"/>
+                            </p:stCondLst>
+                            <p:childTnLst>
+                              <p:par>
+                                <p:cTn id="15" presetID="10" presetClass="entr" presetSubtype="0" fill="hold" nodeType="clickEffect">
+                                  <p:stCondLst>
+                                    <p:cond delay="0"/>
+                                  </p:stCondLst>
+                                  <p:childTnLst>
+                                    <p:set>
+                                      <p:cBhvr>
+                                        <p:cTn id="16" dur="1" fill="hold">
+                                          <p:stCondLst>
+                                            <p:cond delay="0"/>
+                                          </p:stCondLst>
+                                        </p:cTn>
+                                        <p:tgtEl>
+                                          <p:spTgt spid="3"/>
+                                        </p:tgtEl>
+                                        <p:attrNameLst>
+                                          <p:attrName>style.visibility</p:attrName>
+                                        </p:attrNameLst>
+                                      </p:cBhvr>
+                                      <p:to>
+                                        <p:strVal val="visible"/>
+                                      </p:to>
+                                    </p:set>
+                                    <p:animEffect transition="in" filter="fade">
+                                      <p:cBhvr>
+                                        <p:cTn id="17" dur="500"/>
+                                        <p:tgtEl>
+                                          <p:spTgt spid="3"/>
+                                        </p:tgtEl>
+                                      </p:cBhvr>
+                                    </p:animEffect>
+                                  </p:childTnLst>
+                                </p:cTn>
+                              </p:par>
+                            </p:childTnLst>
+                          </p:cTn>
+                        </p:par>
+                      </p:childTnLst>
+                    </p:cTn>
+                  </p:par>
+                  <p:par>
+                    <p:cTn id="18" fill="hold">
+                      <p:stCondLst>
+                        <p:cond delay="indefinite"/>
+                      </p:stCondLst>
+                      <p:childTnLst>
+                        <p:par>
+                          <p:cTn id="19" fill="hold">
+                            <p:stCondLst>
+                              <p:cond delay="0"/>
+                            </p:stCondLst>
+                            <p:childTnLst>
+                              <p:par>
+                                <p:cTn id="20" presetID="10" presetClass="entr" presetSubtype="0" fill="hold" grpId="0" nodeType="clickEffect">
+                                  <p:stCondLst>
+                                    <p:cond delay="0"/>
+                                  </p:stCondLst>
+                                  <p:childTnLst>
+                                    <p:set>
+                                      <p:cBhvr>
+                                        <p:cTn id="21" dur="1" fill="hold">
+                                          <p:stCondLst>
+                                            <p:cond delay="0"/>
+                                          </p:stCondLst>
+                                        </p:cTn>
+                                        <p:tgtEl>
+                                          <p:spTgt spid="56"/>
+                                        </p:tgtEl>
+                                        <p:attrNameLst>
+                                          <p:attrName>style.visibility</p:attrName>
+                                        </p:attrNameLst>
+                                      </p:cBhvr>
+                                      <p:to>
+                                        <p:strVal val="visible"/>
+                                      </p:to>
+                                    </p:set>
+                                    <p:animEffect transition="in" filter="fade">
+                                      <p:cBhvr>
+                                        <p:cTn id="22" dur="500"/>
+                                        <p:tgtEl>
+                                          <p:spTgt spid="56"/>
+                                        </p:tgtEl>
+                                      </p:cBhvr>
+                                    </p:animEffect>
+                                  </p:childTnLst>
+                                </p:cTn>
+                              </p:par>
+                            </p:childTnLst>
+                          </p:cTn>
+                        </p:par>
+                      </p:childTnLst>
+                    </p:cTn>
+                  </p:par>
+                  <p:par>
+                    <p:cTn id="23" fill="hold">
+                      <p:stCondLst>
+                        <p:cond delay="indefinite"/>
+                      </p:stCondLst>
+                      <p:childTnLst>
+                        <p:par>
+                          <p:cTn id="24" fill="hold">
+                            <p:stCondLst>
+                              <p:cond delay="0"/>
+                            </p:stCondLst>
+                            <p:childTnLst>
+                              <p:par>
+                                <p:cTn id="25" presetID="10" presetClass="entr" presetSubtype="0" fill="hold" grpId="0" nodeType="clickEffect">
+                                  <p:stCondLst>
+                                    <p:cond delay="0"/>
+                                  </p:stCondLst>
+                                  <p:childTnLst>
+                                    <p:set>
+                                      <p:cBhvr>
+                                        <p:cTn id="26" dur="1" fill="hold">
+                                          <p:stCondLst>
+                                            <p:cond delay="0"/>
+                                          </p:stCondLst>
+                                        </p:cTn>
+                                        <p:tgtEl>
+                                          <p:spTgt spid="55"/>
+                                        </p:tgtEl>
+                                        <p:attrNameLst>
+                                          <p:attrName>style.visibility</p:attrName>
+                                        </p:attrNameLst>
+                                      </p:cBhvr>
+                                      <p:to>
+                                        <p:strVal val="visible"/>
+                                      </p:to>
+                                    </p:set>
+                                    <p:animEffect transition="in" filter="fade">
+                                      <p:cBhvr>
+                                        <p:cTn id="27" dur="500"/>
+                                        <p:tgtEl>
+                                          <p:spTgt spid="55"/>
+                                        </p:tgtEl>
+                                      </p:cBhvr>
+                                    </p:animEffect>
+                                  </p:childTnLst>
+                                </p:cTn>
+                              </p:par>
+                            </p:childTnLst>
+                          </p:cTn>
+                        </p:par>
+                      </p:childTnLst>
+                    </p:cTn>
+                  </p:par>
+                  <p:par>
+                    <p:cTn id="28" fill="hold">
+                      <p:stCondLst>
+                        <p:cond delay="indefinite"/>
+                      </p:stCondLst>
+                      <p:childTnLst>
+                        <p:par>
+                          <p:cTn id="29" fill="hold">
+                            <p:stCondLst>
+                              <p:cond delay="0"/>
+                            </p:stCondLst>
+                            <p:childTnLst>
+                              <p:par>
+                                <p:cTn id="30" presetID="10" presetClass="entr" presetSubtype="0" fill="hold" nodeType="clickEffect">
+                                  <p:stCondLst>
+                                    <p:cond delay="0"/>
+                                  </p:stCondLst>
+                                  <p:childTnLst>
+                                    <p:set>
+                                      <p:cBhvr>
+                                        <p:cTn id="31" dur="1" fill="hold">
+                                          <p:stCondLst>
+                                            <p:cond delay="0"/>
+                                          </p:stCondLst>
+                                        </p:cTn>
+                                        <p:tgtEl>
+                                          <p:spTgt spid="53"/>
+                                        </p:tgtEl>
+                                        <p:attrNameLst>
+                                          <p:attrName>style.visibility</p:attrName>
+                                        </p:attrNameLst>
+                                      </p:cBhvr>
+                                      <p:to>
+                                        <p:strVal val="visible"/>
+                                      </p:to>
+                                    </p:set>
+                                    <p:animEffect transition="in" filter="fade">
+                                      <p:cBhvr>
+                                        <p:cTn id="32" dur="500"/>
+                                        <p:tgtEl>
+                                          <p:spTgt spid="53"/>
+                                        </p:tgtEl>
+                                      </p:cBhvr>
+                                    </p:animEffect>
+                                  </p:childTnLst>
+                                </p:cTn>
+                              </p:par>
+                            </p:childTnLst>
+                          </p:cTn>
+                        </p:par>
+                      </p:childTnLst>
+                    </p:cTn>
+                  </p:par>
+                  <p:par>
+                    <p:cTn id="33" fill="hold">
+                      <p:stCondLst>
+                        <p:cond delay="indefinite"/>
+                      </p:stCondLst>
+                      <p:childTnLst>
+                        <p:par>
+                          <p:cTn id="34" fill="hold">
+                            <p:stCondLst>
+                              <p:cond delay="0"/>
+                            </p:stCondLst>
+                            <p:childTnLst>
+                              <p:par>
+                                <p:cTn id="35" presetID="10" presetClass="entr" presetSubtype="0" fill="hold" nodeType="clickEffect">
+                                  <p:stCondLst>
+                                    <p:cond delay="0"/>
+                                  </p:stCondLst>
+                                  <p:childTnLst>
+                                    <p:set>
+                                      <p:cBhvr>
+                                        <p:cTn id="36" dur="1" fill="hold">
+                                          <p:stCondLst>
+                                            <p:cond delay="0"/>
+                                          </p:stCondLst>
+                                        </p:cTn>
+                                        <p:tgtEl>
+                                          <p:spTgt spid="37"/>
+                                        </p:tgtEl>
+                                        <p:attrNameLst>
+                                          <p:attrName>style.visibility</p:attrName>
+                                        </p:attrNameLst>
+                                      </p:cBhvr>
+                                      <p:to>
+                                        <p:strVal val="visible"/>
+                                      </p:to>
+                                    </p:set>
+                                    <p:animEffect transition="in" filter="fade">
+                                      <p:cBhvr>
+                                        <p:cTn id="37" dur="500"/>
+                                        <p:tgtEl>
+                                          <p:spTgt spid="37"/>
+                                        </p:tgtEl>
+                                      </p:cBhvr>
+                                    </p:animEffect>
+                                  </p:childTnLst>
+                                </p:cTn>
+                              </p:par>
+                            </p:childTnLst>
+                          </p:cTn>
+                        </p:par>
+                      </p:childTnLst>
+                    </p:cTn>
+                  </p:par>
+                  <p:par>
+                    <p:cTn id="38" fill="hold">
+                      <p:stCondLst>
+                        <p:cond delay="indefinite"/>
+                      </p:stCondLst>
+                      <p:childTnLst>
+                        <p:par>
+                          <p:cTn id="39" fill="hold">
+                            <p:stCondLst>
+                              <p:cond delay="0"/>
+                            </p:stCondLst>
+                            <p:childTnLst>
+                              <p:par>
+                                <p:cTn id="40" presetID="10" presetClass="entr" presetSubtype="0" fill="hold" grpId="0" nodeType="clickEffect">
+                                  <p:stCondLst>
+                                    <p:cond delay="0"/>
+                                  </p:stCondLst>
+                                  <p:childTnLst>
+                                    <p:set>
+                                      <p:cBhvr>
+                                        <p:cTn id="41" dur="1" fill="hold">
+                                          <p:stCondLst>
+                                            <p:cond delay="0"/>
+                                          </p:stCondLst>
+                                        </p:cTn>
+                                        <p:tgtEl>
+                                          <p:spTgt spid="57"/>
+                                        </p:tgtEl>
+                                        <p:attrNameLst>
+                                          <p:attrName>style.visibility</p:attrName>
+                                        </p:attrNameLst>
+                                      </p:cBhvr>
+                                      <p:to>
+                                        <p:strVal val="visible"/>
+                                      </p:to>
+                                    </p:set>
+                                    <p:animEffect transition="in" filter="fade">
+                                      <p:cBhvr>
+                                        <p:cTn id="42" dur="500"/>
+                                        <p:tgtEl>
+                                          <p:spTgt spid="57"/>
+                                        </p:tgtEl>
+                                      </p:cBhvr>
+                                    </p:animEffect>
+                                  </p:childTnLst>
+                                </p:cTn>
+                              </p:par>
+                            </p:childTnLst>
+                          </p:cTn>
+                        </p:par>
+                      </p:childTnLst>
+                    </p:cTn>
+                  </p:par>
+                </p:childTnLst>
+              </p:cTn>
+              <p:prevCondLst>
+                <p:cond evt="onPrev" delay="0">
+                  <p:tgtEl>
+                    <p:sldTgt/>
+                  </p:tgtEl>
+                </p:cond>
+              </p:prevCondLst>
+              <p:nextCondLst>
+                <p:cond evt="onNext" delay="0">
+                  <p:tgtEl>
+                    <p:sldTgt/>
+                  </p:tgtEl>
+                </p:cond>
+              </p:nextCondLst>
+            </p:seq>
+          </p:childTnLst>
+        </p:cTn>
       </p:par>
     </p:tnLst>
+    <p:bldLst>
+      <p:bldP spid="55" grpId="0"/>
+      <p:bldP spid="56" grpId="0" animBg="1"/>
+      <p:bldP spid="57" grpId="0" animBg="1"/>
+    </p:bldLst>
   </p:timing>
 </p:sld>
 </file>
@@ -46638,6 +46852,24 @@
 </file>
 
 <file path=customXml/item1.xml><?xml version="1.0" encoding="utf-8"?>
+<?mso-contentType ?>
+<FormTemplates xmlns="http://schemas.microsoft.com/sharepoint/v3/contenttype/forms">
+  <Display>DocumentLibraryForm</Display>
+  <Edit>DocumentLibraryForm</Edit>
+  <New>DocumentLibraryForm</New>
+</FormTemplates>
+</file>
+
+<file path=customXml/item2.xml><?xml version="1.0" encoding="utf-8"?>
+<p:properties xmlns:p="http://schemas.microsoft.com/office/2006/metadata/properties" xmlns:xsi="http://www.w3.org/2001/XMLSchema-instance">
+  <documentManagement>
+    <PublishingExpirationDate xmlns="http://schemas.microsoft.com/sharepoint/v3" xsi:nil="true"/>
+    <PublishingStartDate xmlns="http://schemas.microsoft.com/sharepoint/v3" xsi:nil="true"/>
+  </documentManagement>
+</p:properties>
+</file>
+
+<file path=customXml/item3.xml><?xml version="1.0" encoding="utf-8"?>
 <ct:contentTypeSchema xmlns:ct="http://schemas.microsoft.com/office/2006/metadata/contentType" xmlns:ma="http://schemas.microsoft.com/office/2006/metadata/properties/metaAttributes" ct:_="" ma:_="" ma:contentTypeName="Document" ma:contentTypeID="0x0101006F401C71F511A342A8CE5D878AC6A5A2" ma:contentTypeVersion="1" ma:contentTypeDescription="Create a new document." ma:contentTypeScope="" ma:versionID="7780538ac0ddf0014d7399d2d91bbce0">
   <xsd:schema xmlns:xsd="http://www.w3.org/2001/XMLSchema" xmlns:p="http://schemas.microsoft.com/office/2006/metadata/properties" xmlns:ns1="http://schemas.microsoft.com/sharepoint/v3" targetNamespace="http://schemas.microsoft.com/office/2006/metadata/properties" ma:root="true" ma:fieldsID="ddb0c952b897a810c8a4e377cff6bff8" ns1:_="">
     <xsd:import namespace="http://schemas.microsoft.com/sharepoint/v3"/>
@@ -46703,25 +46935,30 @@
 </ct:contentTypeSchema>
 </file>
 
-<file path=customXml/item2.xml><?xml version="1.0" encoding="utf-8"?>
-<p:properties xmlns:p="http://schemas.microsoft.com/office/2006/metadata/properties" xmlns:xsi="http://www.w3.org/2001/XMLSchema-instance">
-  <documentManagement>
-    <PublishingExpirationDate xmlns="http://schemas.microsoft.com/sharepoint/v3" xsi:nil="true"/>
-    <PublishingStartDate xmlns="http://schemas.microsoft.com/sharepoint/v3" xsi:nil="true"/>
-  </documentManagement>
-</p:properties>
+<file path=customXml/itemProps1.xml><?xml version="1.0" encoding="utf-8"?>
+<ds:datastoreItem xmlns:ds="http://schemas.openxmlformats.org/officeDocument/2006/customXml" ds:itemID="{C5CC5FB6-44E0-47C0-972B-EBB94824D4B0}">
+  <ds:schemaRefs>
+    <ds:schemaRef ds:uri="http://schemas.microsoft.com/sharepoint/v3/contenttype/forms"/>
+  </ds:schemaRefs>
+</ds:datastoreItem>
 </file>
 
-<file path=customXml/item3.xml><?xml version="1.0" encoding="utf-8"?>
-<?mso-contentType ?>
-<FormTemplates xmlns="http://schemas.microsoft.com/sharepoint/v3/contenttype/forms">
-  <Display>DocumentLibraryForm</Display>
-  <Edit>DocumentLibraryForm</Edit>
-  <New>DocumentLibraryForm</New>
-</FormTemplates>
+<file path=customXml/itemProps2.xml><?xml version="1.0" encoding="utf-8"?>
+<ds:datastoreItem xmlns:ds="http://schemas.openxmlformats.org/officeDocument/2006/customXml" ds:itemID="{14A94C8E-3E2B-4AD9-8D67-7815198BE085}">
+  <ds:schemaRefs>
+    <ds:schemaRef ds:uri="http://schemas.microsoft.com/office/2006/documentManagement/types"/>
+    <ds:schemaRef ds:uri="http://purl.org/dc/terms/"/>
+    <ds:schemaRef ds:uri="http://purl.org/dc/elements/1.1/"/>
+    <ds:schemaRef ds:uri="http://www.w3.org/XML/1998/namespace"/>
+    <ds:schemaRef ds:uri="http://schemas.microsoft.com/office/2006/metadata/properties"/>
+    <ds:schemaRef ds:uri="http://schemas.openxmlformats.org/package/2006/metadata/core-properties"/>
+    <ds:schemaRef ds:uri="http://schemas.microsoft.com/sharepoint/v3"/>
+    <ds:schemaRef ds:uri="http://purl.org/dc/dcmitype/"/>
+  </ds:schemaRefs>
+</ds:datastoreItem>
 </file>
 
-<file path=customXml/itemProps1.xml><?xml version="1.0" encoding="utf-8"?>
+<file path=customXml/itemProps3.xml><?xml version="1.0" encoding="utf-8"?>
 <ds:datastoreItem xmlns:ds="http://schemas.openxmlformats.org/officeDocument/2006/customXml" ds:itemID="{82E76FF6-93BD-4804-AFC1-4178155785E4}">
   <ds:schemaRefs>
     <ds:schemaRef ds:uri="http://schemas.microsoft.com/office/2006/metadata/contentType"/>
@@ -46736,27 +46973,4 @@
     <ds:schemaRef ds:uri="http://schemas.microsoft.com/office/internal/2005/internalDocumentation"/>
   </ds:schemaRefs>
 </ds:datastoreItem>
-</file>
-
-<file path=customXml/itemProps2.xml><?xml version="1.0" encoding="utf-8"?>
-<ds:datastoreItem xmlns:ds="http://schemas.openxmlformats.org/officeDocument/2006/customXml" ds:itemID="{14A94C8E-3E2B-4AD9-8D67-7815198BE085}">
-  <ds:schemaRefs>
-    <ds:schemaRef ds:uri="http://purl.org/dc/terms/"/>
-    <ds:schemaRef ds:uri="http://schemas.microsoft.com/office/2006/metadata/properties"/>
-    <ds:schemaRef ds:uri="http://purl.org/dc/elements/1.1/"/>
-    <ds:schemaRef ds:uri="http://schemas.microsoft.com/office/2006/documentManagement/types"/>
-    <ds:schemaRef ds:uri="http://schemas.openxmlformats.org/package/2006/metadata/core-properties"/>
-    <ds:schemaRef ds:uri="http://schemas.microsoft.com/sharepoint/v3"/>
-    <ds:schemaRef ds:uri="http://purl.org/dc/dcmitype/"/>
-    <ds:schemaRef ds:uri="http://www.w3.org/XML/1998/namespace"/>
-  </ds:schemaRefs>
-</ds:datastoreItem>
-</file>
-
-<file path=customXml/itemProps3.xml><?xml version="1.0" encoding="utf-8"?>
-<ds:datastoreItem xmlns:ds="http://schemas.openxmlformats.org/officeDocument/2006/customXml" ds:itemID="{C5CC5FB6-44E0-47C0-972B-EBB94824D4B0}">
-  <ds:schemaRefs>
-    <ds:schemaRef ds:uri="http://schemas.microsoft.com/sharepoint/v3/contenttype/forms"/>
-  </ds:schemaRefs>
-</ds:datastoreItem>
 </file>
</xml_diff>